<commit_message>
Spelling updates, added some extra content on how many tests
</commit_message>
<xml_diff>
--- a/LDDTesting/LDDTestingPrinciples.pptx
+++ b/LDDTesting/LDDTestingPrinciples.pptx
@@ -29,6 +29,7 @@
     <p:sldId id="277" r:id="rId23"/>
     <p:sldId id="278" r:id="rId24"/>
     <p:sldId id="279" r:id="rId25"/>
+    <p:sldId id="280" r:id="rId26"/>
   </p:sldIdLst>
   <p:sldSz cx="9144000" cy="5143500" type="screen16x9"/>
   <p:notesSz cx="6858000" cy="9144000"/>
@@ -3195,7 +3196,7 @@
             </a:pPr>
             <a:r>
               <a:rPr/>
-              <a:t>2021-02-09</a:t>
+              <a:t>2021-02-10</a:t>
             </a:r>
           </a:p>
         </p:txBody>
@@ -3641,7 +3642,15 @@
             <a:pPr lvl="1"/>
             <a:r>
               <a:rPr/>
-              <a:t>Keep a mapping of xpaths and operations to perform on a location</a:t>
+              <a:t>Keep a mapping of </a:t>
+            </a:r>
+            <a:r>
+              <a:rPr i="1"/>
+              <a:t>XPath</a:t>
+            </a:r>
+            <a:r>
+              <a:rPr/>
+              <a:t>s and operations to perform on a location</a:t>
             </a:r>
           </a:p>
         </p:txBody>
@@ -3688,44 +3697,7 @@
             </a:pPr>
             <a:r>
               <a:rPr/>
-              <a:t>Monolithic tests</a:t>
-            </a:r>
-          </a:p>
-        </p:txBody>
-      </p:sp>
-      <p:sp>
-        <p:nvSpPr>
-          <p:cNvPr id="3" name="Content Placeholder 2"/>
-          <p:cNvSpPr>
-            <a:spLocks noGrp="1"/>
-          </p:cNvSpPr>
-          <p:nvPr>
-            <p:ph idx="1"/>
-          </p:nvPr>
-        </p:nvSpPr>
-        <p:spPr/>
-        <p:txBody>
-          <a:bodyPr/>
-          <a:lstStyle/>
-          <a:p>
-            <a:pPr lvl="0"/>
-            <a:r>
-              <a:rPr/>
-              <a:t>Multiple tests can be packed into a single label</a:t>
-            </a:r>
-          </a:p>
-          <a:p>
-            <a:pPr lvl="0"/>
-            <a:r>
-              <a:rPr/>
-              <a:t>Document each point where the test is expected to fail</a:t>
-            </a:r>
-          </a:p>
-          <a:p>
-            <a:pPr lvl="0"/>
-            <a:r>
-              <a:rPr/>
-              <a:t>Examine the output of the test run to determine if there are any missed failures</a:t>
+              <a:t>Demonstration - LDD Test Generator</a:t>
             </a:r>
           </a:p>
         </p:txBody>
@@ -3772,7 +3744,44 @@
             </a:pPr>
             <a:r>
               <a:rPr/>
-              <a:t>Demonstration - Spectral Dictionary Tests</a:t>
+              <a:t>Monolithic tests</a:t>
+            </a:r>
+          </a:p>
+        </p:txBody>
+      </p:sp>
+      <p:sp>
+        <p:nvSpPr>
+          <p:cNvPr id="3" name="Content Placeholder 2"/>
+          <p:cNvSpPr>
+            <a:spLocks noGrp="1"/>
+          </p:cNvSpPr>
+          <p:nvPr>
+            <p:ph idx="1"/>
+          </p:nvPr>
+        </p:nvSpPr>
+        <p:spPr/>
+        <p:txBody>
+          <a:bodyPr/>
+          <a:lstStyle/>
+          <a:p>
+            <a:pPr lvl="0"/>
+            <a:r>
+              <a:rPr/>
+              <a:t>Multiple tests can be packed into a single label</a:t>
+            </a:r>
+          </a:p>
+          <a:p>
+            <a:pPr lvl="0"/>
+            <a:r>
+              <a:rPr/>
+              <a:t>Document each point where the test is expected to fail</a:t>
+            </a:r>
+          </a:p>
+          <a:p>
+            <a:pPr lvl="0"/>
+            <a:r>
+              <a:rPr/>
+              <a:t>Examine the output of the test run to determine if there are any missed failures</a:t>
             </a:r>
           </a:p>
         </p:txBody>
@@ -3819,44 +3828,7 @@
             </a:pPr>
             <a:r>
               <a:rPr/>
-              <a:t>Interpreting the test output for monolithic tests</a:t>
-            </a:r>
-          </a:p>
-        </p:txBody>
-      </p:sp>
-      <p:sp>
-        <p:nvSpPr>
-          <p:cNvPr id="3" name="Content Placeholder 2"/>
-          <p:cNvSpPr>
-            <a:spLocks noGrp="1"/>
-          </p:cNvSpPr>
-          <p:nvPr>
-            <p:ph idx="1"/>
-          </p:nvPr>
-        </p:nvSpPr>
-        <p:spPr/>
-        <p:txBody>
-          <a:bodyPr/>
-          <a:lstStyle/>
-          <a:p>
-            <a:pPr lvl="0"/>
-            <a:r>
-              <a:rPr/>
-              <a:t>Since monolithic tests have only a pass/fail result, and there are multiple expected failures, it’s possible to miss failures</a:t>
-            </a:r>
-          </a:p>
-          <a:p>
-            <a:pPr lvl="0"/>
-            <a:r>
-              <a:rPr/>
-              <a:t>This can be mitigated by expecting a certain number of failures, or checking for specific failure messages</a:t>
-            </a:r>
-          </a:p>
-          <a:p>
-            <a:pPr lvl="1"/>
-            <a:r>
-              <a:rPr/>
-              <a:t>This would require updates to the test runner</a:t>
+              <a:t>Demonstration - Spectral Dictionary Tests</a:t>
             </a:r>
           </a:p>
         </p:txBody>
@@ -3903,7 +3875,7 @@
             </a:pPr>
             <a:r>
               <a:rPr/>
-              <a:t>How many tests?</a:t>
+              <a:t>Interpreting the test output for monolithic tests</a:t>
             </a:r>
           </a:p>
         </p:txBody>
@@ -3926,49 +3898,21 @@
             <a:pPr lvl="0"/>
             <a:r>
               <a:rPr/>
-              <a:t>You want to have enough to thoroughly test your dictionary.</a:t>
+              <a:t>Since monolithic tests have only a pass/fail result, and there are multiple expected failures, it’s possible to miss failures</a:t>
+            </a:r>
+          </a:p>
+          <a:p>
+            <a:pPr lvl="0"/>
+            <a:r>
+              <a:rPr/>
+              <a:t>This can be mitigated by expecting a certain number of failures, or checking for specific failure messages</a:t>
             </a:r>
           </a:p>
           <a:p>
             <a:pPr lvl="1"/>
             <a:r>
               <a:rPr/>
-              <a:t>Typically, this means that every class should be used at least once</a:t>
-            </a:r>
-          </a:p>
-          <a:p>
-            <a:pPr lvl="1"/>
-            <a:r>
-              <a:rPr/>
-              <a:t>Every schematron rule should be used at least once, as well.</a:t>
-            </a:r>
-          </a:p>
-          <a:p>
-            <a:pPr lvl="0"/>
-            <a:r>
-              <a:rPr/>
-              <a:t>Too many tests can cause problems</a:t>
-            </a:r>
-          </a:p>
-          <a:p>
-            <a:pPr lvl="1"/>
-            <a:r>
-              <a:rPr/>
-              <a:t>The biggest problem with too many tests is that they need to be maintained</a:t>
-            </a:r>
-          </a:p>
-          <a:p>
-            <a:pPr lvl="1"/>
-            <a:r>
-              <a:rPr/>
-              <a:t>Maintenance can be necessary when either your dictionary changes, or when the dependencies change (IM changes, upstream dictionaries, etc)</a:t>
-            </a:r>
-          </a:p>
-          <a:p>
-            <a:pPr lvl="1"/>
-            <a:r>
-              <a:rPr/>
-              <a:t>A test should have its own job – it shouldn’t just functionally duplicate another test</a:t>
+              <a:t>This would require updates to the test runner</a:t>
             </a:r>
           </a:p>
         </p:txBody>
@@ -4134,7 +4078,7 @@
             </a:pPr>
             <a:r>
               <a:rPr/>
-              <a:t>Exercise every class</a:t>
+              <a:t>How many tests?</a:t>
             </a:r>
           </a:p>
         </p:txBody>
@@ -4157,14 +4101,57 @@
             <a:pPr lvl="0"/>
             <a:r>
               <a:rPr/>
-              <a:t>At least one passing test should use each class</a:t>
-            </a:r>
-          </a:p>
-          <a:p>
-            <a:pPr lvl="0"/>
-            <a:r>
-              <a:rPr/>
-              <a:t>Write as many test files as necessary to achieve this.</a:t>
+              <a:t>You want to have enough to thoroughly test your dictionary.</a:t>
+            </a:r>
+          </a:p>
+          <a:p>
+            <a:pPr lvl="1"/>
+            <a:r>
+              <a:rPr/>
+              <a:t>Typically, this means that every class should be used at least once</a:t>
+            </a:r>
+          </a:p>
+          <a:p>
+            <a:pPr lvl="1"/>
+            <a:r>
+              <a:rPr/>
+              <a:t>Every schematron rule should pass and fail at least once, as well.</a:t>
+            </a:r>
+          </a:p>
+          <a:p>
+            <a:pPr lvl="0"/>
+            <a:r>
+              <a:rPr/>
+              <a:t>Too many tests can cause problems (This does </a:t>
+            </a:r>
+            <a:r>
+              <a:rPr i="1"/>
+              <a:t>not</a:t>
+            </a:r>
+            <a:r>
+              <a:rPr/>
+              <a:t> mean don’t write tests)</a:t>
+            </a:r>
+          </a:p>
+          <a:p>
+            <a:pPr lvl="1"/>
+            <a:r>
+              <a:rPr/>
+              <a:t>The biggest problem with too many tests is that they need to be maintained</a:t>
+            </a:r>
+          </a:p>
+          <a:p>
+            <a:pPr lvl="1"/>
+            <a:r>
+              <a:rPr/>
+              <a:t>Maintenance can be necessary when either your dictionary changes, or when the dependencies change (IM changes, upstream dictionaries, etc)</a:t>
+            </a:r>
+          </a:p>
+          <a:p>
+            <a:pPr lvl="1"/>
+            <a:r>
+              <a:rPr/>
+              <a:t>A test should have its own job – it shouldn’t just functionally duplicate another test</a:t>
             </a:r>
           </a:p>
         </p:txBody>
@@ -4211,7 +4198,7 @@
             </a:pPr>
             <a:r>
               <a:rPr/>
-              <a:t>Exercise every schematron rule</a:t>
+              <a:t>Exercise every class</a:t>
             </a:r>
           </a:p>
         </p:txBody>
@@ -4234,14 +4221,14 @@
             <a:pPr lvl="0"/>
             <a:r>
               <a:rPr/>
-              <a:t>At least one failing test should fail a schematron rule.</a:t>
-            </a:r>
-          </a:p>
-          <a:p>
-            <a:pPr lvl="0"/>
-            <a:r>
-              <a:rPr/>
-              <a:t>This is especially important, since schematron rules can be prevented from triggering if incorrectly written.</a:t>
+              <a:t>At least one passing test should use each class</a:t>
+            </a:r>
+          </a:p>
+          <a:p>
+            <a:pPr lvl="0"/>
+            <a:r>
+              <a:rPr/>
+              <a:t>Write as many test files as necessary to achieve this.</a:t>
             </a:r>
           </a:p>
         </p:txBody>
@@ -4288,7 +4275,51 @@
             </a:pPr>
             <a:r>
               <a:rPr/>
-              <a:t>Demonstration - Nucspec Dictionary Tests</a:t>
+              <a:t>Exercise every schematron rule</a:t>
+            </a:r>
+          </a:p>
+        </p:txBody>
+      </p:sp>
+      <p:sp>
+        <p:nvSpPr>
+          <p:cNvPr id="3" name="Content Placeholder 2"/>
+          <p:cNvSpPr>
+            <a:spLocks noGrp="1"/>
+          </p:cNvSpPr>
+          <p:nvPr>
+            <p:ph idx="1"/>
+          </p:nvPr>
+        </p:nvSpPr>
+        <p:spPr/>
+        <p:txBody>
+          <a:bodyPr/>
+          <a:lstStyle/>
+          <a:p>
+            <a:pPr lvl="0"/>
+            <a:r>
+              <a:rPr/>
+              <a:t>At least one invalid label test should fail each schematron rule.</a:t>
+            </a:r>
+          </a:p>
+          <a:p>
+            <a:pPr lvl="0"/>
+            <a:r>
+              <a:rPr/>
+              <a:t>At least one valid label test should pass each schematron rule</a:t>
+            </a:r>
+          </a:p>
+          <a:p>
+            <a:pPr lvl="0"/>
+            <a:r>
+              <a:rPr/>
+              <a:t>At least one valid label test should not trigger the schematron rule, if possible.</a:t>
+            </a:r>
+          </a:p>
+          <a:p>
+            <a:pPr lvl="0"/>
+            <a:r>
+              <a:rPr/>
+              <a:t>This is especially important, since schematron rules can be prevented from triggering if incorrectly written.</a:t>
             </a:r>
           </a:p>
         </p:txBody>
@@ -4335,44 +4366,7 @@
             </a:pPr>
             <a:r>
               <a:rPr/>
-              <a:t>Document the tests</a:t>
-            </a:r>
-          </a:p>
-        </p:txBody>
-      </p:sp>
-      <p:sp>
-        <p:nvSpPr>
-          <p:cNvPr id="3" name="Content Placeholder 2"/>
-          <p:cNvSpPr>
-            <a:spLocks noGrp="1"/>
-          </p:cNvSpPr>
-          <p:nvPr>
-            <p:ph idx="1"/>
-          </p:nvPr>
-        </p:nvSpPr>
-        <p:spPr/>
-        <p:txBody>
-          <a:bodyPr/>
-          <a:lstStyle/>
-          <a:p>
-            <a:pPr lvl="0"/>
-            <a:r>
-              <a:rPr/>
-              <a:t>Documentation can be as simple as a file that lists the test name and what it is testing.</a:t>
-            </a:r>
-          </a:p>
-          <a:p>
-            <a:pPr lvl="0"/>
-            <a:r>
-              <a:rPr/>
-              <a:t>This will remind you how each test is expected to fail, or what each test is intended to exercise.</a:t>
-            </a:r>
-          </a:p>
-          <a:p>
-            <a:pPr lvl="0"/>
-            <a:r>
-              <a:rPr/>
-              <a:t>If writing a monolithic test, this can be further developed into the expected output for comparison in a future version of the EN testing tool.</a:t>
+              <a:t>Demonstration - Nucspec Dictionary Tests</a:t>
             </a:r>
           </a:p>
         </p:txBody>
@@ -4419,6 +4413,97 @@
             </a:pPr>
             <a:r>
               <a:rPr/>
+              <a:t>Document the tests</a:t>
+            </a:r>
+          </a:p>
+        </p:txBody>
+      </p:sp>
+      <p:sp>
+        <p:nvSpPr>
+          <p:cNvPr id="3" name="Content Placeholder 2"/>
+          <p:cNvSpPr>
+            <a:spLocks noGrp="1"/>
+          </p:cNvSpPr>
+          <p:nvPr>
+            <p:ph idx="1"/>
+          </p:nvPr>
+        </p:nvSpPr>
+        <p:spPr/>
+        <p:txBody>
+          <a:bodyPr/>
+          <a:lstStyle/>
+          <a:p>
+            <a:pPr lvl="0"/>
+            <a:r>
+              <a:rPr/>
+              <a:t>Documentation can be as simple as a file that lists the test name and what it is testing.</a:t>
+            </a:r>
+          </a:p>
+          <a:p>
+            <a:pPr lvl="0"/>
+            <a:r>
+              <a:rPr/>
+              <a:t>This will remind you how each test is expected to fail, or what each test is intended to exercise.</a:t>
+            </a:r>
+          </a:p>
+          <a:p>
+            <a:pPr lvl="0"/>
+            <a:r>
+              <a:rPr/>
+              <a:t>If writing a monolithic test, this can be further developed into the expected output for comparison in a future version of the EN testing tool.</a:t>
+            </a:r>
+          </a:p>
+          <a:p>
+            <a:pPr lvl="0"/>
+            <a:r>
+              <a:rPr/>
+              <a:t>Documenation can also be written inline. It would be valuable to note precisely which line should fail.</a:t>
+            </a:r>
+          </a:p>
+        </p:txBody>
+      </p:sp>
+    </p:spTree>
+  </p:cSld>
+</p:sld>
+</file>
+
+<file path=ppt/slides/slide25.xml><?xml version="1.0" encoding="utf-8"?>
+<p:sld xmlns:a="http://schemas.openxmlformats.org/drawingml/2006/main" xmlns:r="http://schemas.openxmlformats.org/officeDocument/2006/relationships" xmlns:p="http://schemas.openxmlformats.org/presentationml/2006/main">
+  <p:cSld>
+    <p:spTree>
+      <p:nvGrpSpPr>
+        <p:cNvPr id="1" name=""/>
+        <p:cNvGrpSpPr/>
+        <p:nvPr/>
+      </p:nvGrpSpPr>
+      <p:grpSpPr>
+        <a:xfrm>
+          <a:off x="0" y="0"/>
+          <a:ext cx="0" cy="0"/>
+          <a:chOff x="0" y="0"/>
+          <a:chExt cx="0" cy="0"/>
+        </a:xfrm>
+      </p:grpSpPr>
+      <p:sp>
+        <p:nvSpPr>
+          <p:cNvPr id="2" name="Title 1"/>
+          <p:cNvSpPr>
+            <a:spLocks noGrp="1"/>
+          </p:cNvSpPr>
+          <p:nvPr>
+            <p:ph type="title"/>
+          </p:nvPr>
+        </p:nvSpPr>
+        <p:spPr/>
+        <p:txBody>
+          <a:bodyPr/>
+          <a:lstStyle/>
+          <a:p>
+            <a:pPr lvl="0" indent="0" marL="0">
+              <a:buNone/>
+            </a:pPr>
+            <a:r>
+              <a:rPr/>
               <a:t>Organize the tests</a:t>
             </a:r>
           </a:p>
@@ -4766,14 +4851,14 @@
             <a:pPr lvl="0"/>
             <a:r>
               <a:rPr/>
-              <a:t>These are meant to test situtations where the label should work</a:t>
-            </a:r>
-          </a:p>
-          <a:p>
-            <a:pPr lvl="0"/>
-            <a:r>
-              <a:rPr/>
-              <a:t>This can contain a variety of different labels that exercise each aspect of the dictionary</a:t>
+              <a:t>These are meant to test situations where the label should work</a:t>
+            </a:r>
+          </a:p>
+          <a:p>
+            <a:pPr lvl="0"/>
+            <a:r>
+              <a:rPr/>
+              <a:t>These can consist of a variety of different labels that exercise each aspect of the dictionary</a:t>
             </a:r>
           </a:p>
         </p:txBody>

</xml_diff>